<commit_message>
adding more images and content to computing ch
</commit_message>
<xml_diff>
--- a/image_slides.pptx
+++ b/image_slides.pptx
@@ -5,7 +5,7 @@
     <p:sldMasterId id="2147483648" r:id="rId1"/>
   </p:sldMasterIdLst>
   <p:notesMasterIdLst>
-    <p:notesMasterId r:id="rId18"/>
+    <p:notesMasterId r:id="rId20"/>
   </p:notesMasterIdLst>
   <p:sldIdLst>
     <p:sldId id="256" r:id="rId2"/>
@@ -24,6 +24,8 @@
     <p:sldId id="270" r:id="rId15"/>
     <p:sldId id="271" r:id="rId16"/>
     <p:sldId id="272" r:id="rId17"/>
+    <p:sldId id="280" r:id="rId18"/>
+    <p:sldId id="281" r:id="rId19"/>
   </p:sldIdLst>
   <p:sldSz cx="12192000" cy="6858000"/>
   <p:notesSz cx="6858000" cy="9144000"/>
@@ -638,6 +640,258 @@
     <p:extLst>
       <p:ext uri="{BB962C8B-B14F-4D97-AF65-F5344CB8AC3E}">
         <p14:creationId xmlns:p14="http://schemas.microsoft.com/office/powerpoint/2010/main" val="3891155553"/>
+      </p:ext>
+    </p:extLst>
+  </p:cSld>
+  <p:clrMapOvr>
+    <a:masterClrMapping/>
+  </p:clrMapOvr>
+</p:notes>
+</file>
+
+<file path=ppt/notesSlides/notesSlide3.xml><?xml version="1.0" encoding="utf-8"?>
+<p:notes xmlns:a="http://schemas.openxmlformats.org/drawingml/2006/main" xmlns:r="http://schemas.openxmlformats.org/officeDocument/2006/relationships" xmlns:p="http://schemas.openxmlformats.org/presentationml/2006/main">
+  <p:cSld>
+    <p:spTree>
+      <p:nvGrpSpPr>
+        <p:cNvPr id="1" name=""/>
+        <p:cNvGrpSpPr/>
+        <p:nvPr/>
+      </p:nvGrpSpPr>
+      <p:grpSpPr>
+        <a:xfrm>
+          <a:off x="0" y="0"/>
+          <a:ext cx="0" cy="0"/>
+          <a:chOff x="0" y="0"/>
+          <a:chExt cx="0" cy="0"/>
+        </a:xfrm>
+      </p:grpSpPr>
+      <p:sp>
+        <p:nvSpPr>
+          <p:cNvPr id="2" name="Slide Image Placeholder 1"/>
+          <p:cNvSpPr>
+            <a:spLocks noGrp="1" noRot="1" noChangeAspect="1"/>
+          </p:cNvSpPr>
+          <p:nvPr>
+            <p:ph type="sldImg"/>
+          </p:nvPr>
+        </p:nvSpPr>
+        <p:spPr/>
+      </p:sp>
+      <p:sp>
+        <p:nvSpPr>
+          <p:cNvPr id="3" name="Notes Placeholder 2"/>
+          <p:cNvSpPr>
+            <a:spLocks noGrp="1"/>
+          </p:cNvSpPr>
+          <p:nvPr>
+            <p:ph type="body" idx="1"/>
+          </p:nvPr>
+        </p:nvSpPr>
+        <p:spPr/>
+        <p:txBody>
+          <a:bodyPr/>
+          <a:lstStyle/>
+          <a:p>
+            <a:endParaRPr lang="en-US"/>
+          </a:p>
+        </p:txBody>
+      </p:sp>
+      <p:sp>
+        <p:nvSpPr>
+          <p:cNvPr id="4" name="Slide Number Placeholder 3"/>
+          <p:cNvSpPr>
+            <a:spLocks noGrp="1"/>
+          </p:cNvSpPr>
+          <p:nvPr>
+            <p:ph type="sldNum" sz="quarter" idx="5"/>
+          </p:nvPr>
+        </p:nvSpPr>
+        <p:spPr/>
+        <p:txBody>
+          <a:bodyPr/>
+          <a:lstStyle/>
+          <a:p>
+            <a:fld id="{7A31CD48-4264-4344-94BB-0BCCE6CCE321}" type="slidenum">
+              <a:rPr lang="en-US" smtClean="0"/>
+              <a:t>5</a:t>
+            </a:fld>
+            <a:endParaRPr lang="en-US"/>
+          </a:p>
+        </p:txBody>
+      </p:sp>
+    </p:spTree>
+    <p:extLst>
+      <p:ext uri="{BB962C8B-B14F-4D97-AF65-F5344CB8AC3E}">
+        <p14:creationId xmlns:p14="http://schemas.microsoft.com/office/powerpoint/2010/main" val="1518592504"/>
+      </p:ext>
+    </p:extLst>
+  </p:cSld>
+  <p:clrMapOvr>
+    <a:masterClrMapping/>
+  </p:clrMapOvr>
+</p:notes>
+</file>
+
+<file path=ppt/notesSlides/notesSlide4.xml><?xml version="1.0" encoding="utf-8"?>
+<p:notes xmlns:a="http://schemas.openxmlformats.org/drawingml/2006/main" xmlns:r="http://schemas.openxmlformats.org/officeDocument/2006/relationships" xmlns:p="http://schemas.openxmlformats.org/presentationml/2006/main">
+  <p:cSld>
+    <p:spTree>
+      <p:nvGrpSpPr>
+        <p:cNvPr id="1" name=""/>
+        <p:cNvGrpSpPr/>
+        <p:nvPr/>
+      </p:nvGrpSpPr>
+      <p:grpSpPr>
+        <a:xfrm>
+          <a:off x="0" y="0"/>
+          <a:ext cx="0" cy="0"/>
+          <a:chOff x="0" y="0"/>
+          <a:chExt cx="0" cy="0"/>
+        </a:xfrm>
+      </p:grpSpPr>
+      <p:sp>
+        <p:nvSpPr>
+          <p:cNvPr id="2" name="Slide Image Placeholder 1"/>
+          <p:cNvSpPr>
+            <a:spLocks noGrp="1" noRot="1" noChangeAspect="1"/>
+          </p:cNvSpPr>
+          <p:nvPr>
+            <p:ph type="sldImg"/>
+          </p:nvPr>
+        </p:nvSpPr>
+        <p:spPr/>
+      </p:sp>
+      <p:sp>
+        <p:nvSpPr>
+          <p:cNvPr id="3" name="Notes Placeholder 2"/>
+          <p:cNvSpPr>
+            <a:spLocks noGrp="1"/>
+          </p:cNvSpPr>
+          <p:nvPr>
+            <p:ph type="body" idx="1"/>
+          </p:nvPr>
+        </p:nvSpPr>
+        <p:spPr/>
+        <p:txBody>
+          <a:bodyPr/>
+          <a:lstStyle/>
+          <a:p>
+            <a:endParaRPr lang="en-US"/>
+          </a:p>
+        </p:txBody>
+      </p:sp>
+      <p:sp>
+        <p:nvSpPr>
+          <p:cNvPr id="4" name="Slide Number Placeholder 3"/>
+          <p:cNvSpPr>
+            <a:spLocks noGrp="1"/>
+          </p:cNvSpPr>
+          <p:nvPr>
+            <p:ph type="sldNum" sz="quarter" idx="5"/>
+          </p:nvPr>
+        </p:nvSpPr>
+        <p:spPr/>
+        <p:txBody>
+          <a:bodyPr/>
+          <a:lstStyle/>
+          <a:p>
+            <a:fld id="{7A31CD48-4264-4344-94BB-0BCCE6CCE321}" type="slidenum">
+              <a:rPr lang="en-US" smtClean="0"/>
+              <a:t>6</a:t>
+            </a:fld>
+            <a:endParaRPr lang="en-US"/>
+          </a:p>
+        </p:txBody>
+      </p:sp>
+    </p:spTree>
+    <p:extLst>
+      <p:ext uri="{BB962C8B-B14F-4D97-AF65-F5344CB8AC3E}">
+        <p14:creationId xmlns:p14="http://schemas.microsoft.com/office/powerpoint/2010/main" val="287936627"/>
+      </p:ext>
+    </p:extLst>
+  </p:cSld>
+  <p:clrMapOvr>
+    <a:masterClrMapping/>
+  </p:clrMapOvr>
+</p:notes>
+</file>
+
+<file path=ppt/notesSlides/notesSlide5.xml><?xml version="1.0" encoding="utf-8"?>
+<p:notes xmlns:a="http://schemas.openxmlformats.org/drawingml/2006/main" xmlns:r="http://schemas.openxmlformats.org/officeDocument/2006/relationships" xmlns:p="http://schemas.openxmlformats.org/presentationml/2006/main">
+  <p:cSld>
+    <p:spTree>
+      <p:nvGrpSpPr>
+        <p:cNvPr id="1" name=""/>
+        <p:cNvGrpSpPr/>
+        <p:nvPr/>
+      </p:nvGrpSpPr>
+      <p:grpSpPr>
+        <a:xfrm>
+          <a:off x="0" y="0"/>
+          <a:ext cx="0" cy="0"/>
+          <a:chOff x="0" y="0"/>
+          <a:chExt cx="0" cy="0"/>
+        </a:xfrm>
+      </p:grpSpPr>
+      <p:sp>
+        <p:nvSpPr>
+          <p:cNvPr id="2" name="Slide Image Placeholder 1"/>
+          <p:cNvSpPr>
+            <a:spLocks noGrp="1" noRot="1" noChangeAspect="1"/>
+          </p:cNvSpPr>
+          <p:nvPr>
+            <p:ph type="sldImg"/>
+          </p:nvPr>
+        </p:nvSpPr>
+        <p:spPr/>
+      </p:sp>
+      <p:sp>
+        <p:nvSpPr>
+          <p:cNvPr id="3" name="Notes Placeholder 2"/>
+          <p:cNvSpPr>
+            <a:spLocks noGrp="1"/>
+          </p:cNvSpPr>
+          <p:nvPr>
+            <p:ph type="body" idx="1"/>
+          </p:nvPr>
+        </p:nvSpPr>
+        <p:spPr/>
+        <p:txBody>
+          <a:bodyPr/>
+          <a:lstStyle/>
+          <a:p>
+            <a:endParaRPr lang="en-US"/>
+          </a:p>
+        </p:txBody>
+      </p:sp>
+      <p:sp>
+        <p:nvSpPr>
+          <p:cNvPr id="4" name="Slide Number Placeholder 3"/>
+          <p:cNvSpPr>
+            <a:spLocks noGrp="1"/>
+          </p:cNvSpPr>
+          <p:nvPr>
+            <p:ph type="sldNum" sz="quarter" idx="5"/>
+          </p:nvPr>
+        </p:nvSpPr>
+        <p:spPr/>
+        <p:txBody>
+          <a:bodyPr/>
+          <a:lstStyle/>
+          <a:p>
+            <a:fld id="{7A31CD48-4264-4344-94BB-0BCCE6CCE321}" type="slidenum">
+              <a:rPr lang="en-US" smtClean="0"/>
+              <a:t>11</a:t>
+            </a:fld>
+            <a:endParaRPr lang="en-US"/>
+          </a:p>
+        </p:txBody>
+      </p:sp>
+    </p:spTree>
+    <p:extLst>
+      <p:ext uri="{BB962C8B-B14F-4D97-AF65-F5344CB8AC3E}">
+        <p14:creationId xmlns:p14="http://schemas.microsoft.com/office/powerpoint/2010/main" val="1100377820"/>
       </p:ext>
     </p:extLst>
   </p:cSld>
@@ -5630,7 +5884,7 @@
           <p:nvPr/>
         </p:nvPicPr>
         <p:blipFill>
-          <a:blip r:embed="rId2">
+          <a:blip r:embed="rId3">
             <a:extLst>
               <a:ext uri="{28A0092B-C50C-407E-A947-70E740481C1C}">
                 <a14:useLocalDpi xmlns:a14="http://schemas.microsoft.com/office/drawing/2010/main" val="0"/>
@@ -5644,8 +5898,8 @@
         </p:blipFill>
         <p:spPr bwMode="auto">
           <a:xfrm>
-            <a:off x="2667000" y="0"/>
-            <a:ext cx="6858000" cy="6858000"/>
+            <a:off x="414338" y="-2252662"/>
+            <a:ext cx="9110662" cy="9110662"/>
           </a:xfrm>
           <a:prstGeom prst="rect">
             <a:avLst/>
@@ -6184,8 +6438,8 @@
         </p:blipFill>
         <p:spPr bwMode="auto">
           <a:xfrm>
-            <a:off x="2667000" y="0"/>
-            <a:ext cx="6858000" cy="6858000"/>
+            <a:off x="1857375" y="-809625"/>
+            <a:ext cx="8672513" cy="8672513"/>
           </a:xfrm>
           <a:prstGeom prst="rect">
             <a:avLst/>
@@ -6206,6 +6460,335 @@
     <p:extLst>
       <p:ext uri="{BB962C8B-B14F-4D97-AF65-F5344CB8AC3E}">
         <p14:creationId xmlns:p14="http://schemas.microsoft.com/office/powerpoint/2010/main" val="1224254915"/>
+      </p:ext>
+    </p:extLst>
+  </p:cSld>
+  <p:clrMapOvr>
+    <a:masterClrMapping/>
+  </p:clrMapOvr>
+</p:sld>
+</file>
+
+<file path=ppt/slides/slide17.xml><?xml version="1.0" encoding="utf-8"?>
+<p:sld xmlns:a="http://schemas.openxmlformats.org/drawingml/2006/main" xmlns:r="http://schemas.openxmlformats.org/officeDocument/2006/relationships" xmlns:p="http://schemas.openxmlformats.org/presentationml/2006/main">
+  <p:cSld>
+    <p:spTree>
+      <p:nvGrpSpPr>
+        <p:cNvPr id="1" name=""/>
+        <p:cNvGrpSpPr/>
+        <p:nvPr/>
+      </p:nvGrpSpPr>
+      <p:grpSpPr>
+        <a:xfrm>
+          <a:off x="0" y="0"/>
+          <a:ext cx="0" cy="0"/>
+          <a:chOff x="0" y="0"/>
+          <a:chExt cx="0" cy="0"/>
+        </a:xfrm>
+      </p:grpSpPr>
+      <p:pic>
+        <p:nvPicPr>
+          <p:cNvPr id="6" name="Picture 5" descr="A person holding a computer&#10;&#10;Description automatically generated with medium confidence">
+            <a:extLst>
+              <a:ext uri="{FF2B5EF4-FFF2-40B4-BE49-F238E27FC236}">
+                <a16:creationId xmlns:a16="http://schemas.microsoft.com/office/drawing/2014/main" id="{2DBB1267-FB4D-0D46-B088-3905EE7D5FF6}"/>
+              </a:ext>
+            </a:extLst>
+          </p:cNvPr>
+          <p:cNvPicPr>
+            <a:picLocks noChangeAspect="1"/>
+          </p:cNvPicPr>
+          <p:nvPr/>
+        </p:nvPicPr>
+        <p:blipFill rotWithShape="1">
+          <a:blip r:embed="rId2"/>
+          <a:srcRect t="3802"/>
+          <a:stretch/>
+        </p:blipFill>
+        <p:spPr>
+          <a:xfrm>
+            <a:off x="3013075" y="1382712"/>
+            <a:ext cx="3082925" cy="3170237"/>
+          </a:xfrm>
+          <a:prstGeom prst="rect">
+            <a:avLst/>
+          </a:prstGeom>
+        </p:spPr>
+      </p:pic>
+      <p:pic>
+        <p:nvPicPr>
+          <p:cNvPr id="9" name="Picture 8">
+            <a:extLst>
+              <a:ext uri="{FF2B5EF4-FFF2-40B4-BE49-F238E27FC236}">
+                <a16:creationId xmlns:a16="http://schemas.microsoft.com/office/drawing/2014/main" id="{30A8716A-ADC0-D949-96FF-0987F1683957}"/>
+              </a:ext>
+            </a:extLst>
+          </p:cNvPr>
+          <p:cNvPicPr>
+            <a:picLocks noChangeAspect="1"/>
+          </p:cNvPicPr>
+          <p:nvPr/>
+        </p:nvPicPr>
+        <p:blipFill>
+          <a:blip r:embed="rId3"/>
+          <a:stretch>
+            <a:fillRect/>
+          </a:stretch>
+        </p:blipFill>
+        <p:spPr>
+          <a:xfrm>
+            <a:off x="6670675" y="1557338"/>
+            <a:ext cx="2711077" cy="2820986"/>
+          </a:xfrm>
+          <a:prstGeom prst="rect">
+            <a:avLst/>
+          </a:prstGeom>
+        </p:spPr>
+      </p:pic>
+      <p:cxnSp>
+        <p:nvCxnSpPr>
+          <p:cNvPr id="11" name="Straight Arrow Connector 10">
+            <a:extLst>
+              <a:ext uri="{FF2B5EF4-FFF2-40B4-BE49-F238E27FC236}">
+                <a16:creationId xmlns:a16="http://schemas.microsoft.com/office/drawing/2014/main" id="{543D6B61-E50F-C34C-AB02-CC5E2D0CDB4E}"/>
+              </a:ext>
+            </a:extLst>
+          </p:cNvPr>
+          <p:cNvCxnSpPr/>
+          <p:nvPr/>
+        </p:nvCxnSpPr>
+        <p:spPr>
+          <a:xfrm>
+            <a:off x="5695950" y="3167855"/>
+            <a:ext cx="800100" cy="0"/>
+          </a:xfrm>
+          <a:prstGeom prst="straightConnector1">
+            <a:avLst/>
+          </a:prstGeom>
+          <a:ln w="57150">
+            <a:tailEnd type="triangle"/>
+          </a:ln>
+        </p:spPr>
+        <p:style>
+          <a:lnRef idx="1">
+            <a:schemeClr val="accent1"/>
+          </a:lnRef>
+          <a:fillRef idx="0">
+            <a:schemeClr val="accent1"/>
+          </a:fillRef>
+          <a:effectRef idx="0">
+            <a:schemeClr val="accent1"/>
+          </a:effectRef>
+          <a:fontRef idx="minor">
+            <a:schemeClr val="tx1"/>
+          </a:fontRef>
+        </p:style>
+      </p:cxnSp>
+      <p:sp>
+        <p:nvSpPr>
+          <p:cNvPr id="12" name="Rectangle 11">
+            <a:extLst>
+              <a:ext uri="{FF2B5EF4-FFF2-40B4-BE49-F238E27FC236}">
+                <a16:creationId xmlns:a16="http://schemas.microsoft.com/office/drawing/2014/main" id="{274F2B08-43FD-0549-BE21-8FB34B74C249}"/>
+              </a:ext>
+            </a:extLst>
+          </p:cNvPr>
+          <p:cNvSpPr/>
+          <p:nvPr/>
+        </p:nvSpPr>
+        <p:spPr>
+          <a:xfrm>
+            <a:off x="4195763" y="4377332"/>
+            <a:ext cx="7353300" cy="923330"/>
+          </a:xfrm>
+          <a:prstGeom prst="rect">
+            <a:avLst/>
+          </a:prstGeom>
+        </p:spPr>
+        <p:txBody>
+          <a:bodyPr wrap="square">
+            <a:spAutoFit/>
+          </a:bodyPr>
+          <a:lstStyle/>
+          <a:p>
+            <a:r>
+              <a:rPr lang="en-US" dirty="0">
+                <a:solidFill>
+                  <a:srgbClr val="595959"/>
+                </a:solidFill>
+                <a:latin typeface="Roboto Condensed" panose="02000000000000000000" pitchFamily="2" charset="0"/>
+              </a:rPr>
+              <a:t>Image created by </a:t>
+            </a:r>
+            <a:r>
+              <a:rPr lang="en-US" dirty="0" err="1">
+                <a:solidFill>
+                  <a:srgbClr val="595959"/>
+                </a:solidFill>
+                <a:latin typeface="Roboto Condensed" panose="02000000000000000000" pitchFamily="2" charset="0"/>
+              </a:rPr>
+              <a:t>macrovector</a:t>
+            </a:r>
+            <a:r>
+              <a:rPr lang="en-US" dirty="0">
+                <a:solidFill>
+                  <a:srgbClr val="595959"/>
+                </a:solidFill>
+                <a:latin typeface="Roboto Condensed" panose="02000000000000000000" pitchFamily="2" charset="0"/>
+              </a:rPr>
+              <a:t> - </a:t>
+            </a:r>
+            <a:r>
+              <a:rPr lang="en-US" dirty="0" err="1">
+                <a:solidFill>
+                  <a:srgbClr val="595959"/>
+                </a:solidFill>
+                <a:latin typeface="Roboto Condensed" panose="02000000000000000000" pitchFamily="2" charset="0"/>
+              </a:rPr>
+              <a:t>www.freepik.com</a:t>
+            </a:r>
+            <a:endParaRPr lang="en-US" dirty="0"/>
+          </a:p>
+          <a:p>
+            <a:br>
+              <a:rPr lang="en-US" dirty="0"/>
+            </a:br>
+            <a:endParaRPr lang="en-US" dirty="0"/>
+          </a:p>
+        </p:txBody>
+      </p:sp>
+    </p:spTree>
+    <p:extLst>
+      <p:ext uri="{BB962C8B-B14F-4D97-AF65-F5344CB8AC3E}">
+        <p14:creationId xmlns:p14="http://schemas.microsoft.com/office/powerpoint/2010/main" val="1132413903"/>
+      </p:ext>
+    </p:extLst>
+  </p:cSld>
+  <p:clrMapOvr>
+    <a:masterClrMapping/>
+  </p:clrMapOvr>
+</p:sld>
+</file>
+
+<file path=ppt/slides/slide18.xml><?xml version="1.0" encoding="utf-8"?>
+<p:sld xmlns:a="http://schemas.openxmlformats.org/drawingml/2006/main" xmlns:r="http://schemas.openxmlformats.org/officeDocument/2006/relationships" xmlns:p="http://schemas.openxmlformats.org/presentationml/2006/main">
+  <p:cSld>
+    <p:spTree>
+      <p:nvGrpSpPr>
+        <p:cNvPr id="1" name=""/>
+        <p:cNvGrpSpPr/>
+        <p:nvPr/>
+      </p:nvGrpSpPr>
+      <p:grpSpPr>
+        <a:xfrm>
+          <a:off x="0" y="0"/>
+          <a:ext cx="0" cy="0"/>
+          <a:chOff x="0" y="0"/>
+          <a:chExt cx="0" cy="0"/>
+        </a:xfrm>
+      </p:grpSpPr>
+      <p:sp>
+        <p:nvSpPr>
+          <p:cNvPr id="2" name="Title 1">
+            <a:extLst>
+              <a:ext uri="{FF2B5EF4-FFF2-40B4-BE49-F238E27FC236}">
+                <a16:creationId xmlns:a16="http://schemas.microsoft.com/office/drawing/2014/main" id="{20EBCA29-B058-2540-BE7A-D4CB4EEC05ED}"/>
+              </a:ext>
+            </a:extLst>
+          </p:cNvPr>
+          <p:cNvSpPr>
+            <a:spLocks noGrp="1"/>
+          </p:cNvSpPr>
+          <p:nvPr>
+            <p:ph type="title"/>
+          </p:nvPr>
+        </p:nvSpPr>
+        <p:spPr/>
+        <p:txBody>
+          <a:bodyPr/>
+          <a:lstStyle/>
+          <a:p>
+            <a:endParaRPr lang="en-US"/>
+          </a:p>
+        </p:txBody>
+      </p:sp>
+      <p:sp>
+        <p:nvSpPr>
+          <p:cNvPr id="4" name="Rectangle 3">
+            <a:extLst>
+              <a:ext uri="{FF2B5EF4-FFF2-40B4-BE49-F238E27FC236}">
+                <a16:creationId xmlns:a16="http://schemas.microsoft.com/office/drawing/2014/main" id="{6D8B10D4-8155-DF42-A075-60450DA2AE13}"/>
+              </a:ext>
+            </a:extLst>
+          </p:cNvPr>
+          <p:cNvSpPr/>
+          <p:nvPr/>
+        </p:nvSpPr>
+        <p:spPr>
+          <a:xfrm>
+            <a:off x="3810000" y="6143731"/>
+            <a:ext cx="7353300" cy="923330"/>
+          </a:xfrm>
+          <a:prstGeom prst="rect">
+            <a:avLst/>
+          </a:prstGeom>
+        </p:spPr>
+        <p:txBody>
+          <a:bodyPr wrap="square">
+            <a:spAutoFit/>
+          </a:bodyPr>
+          <a:lstStyle/>
+          <a:p>
+            <a:r>
+              <a:rPr lang="en-US" dirty="0">
+                <a:solidFill>
+                  <a:srgbClr val="595959"/>
+                </a:solidFill>
+                <a:latin typeface="Roboto Condensed" panose="02000000000000000000" pitchFamily="2" charset="0"/>
+              </a:rPr>
+              <a:t>Image created by </a:t>
+            </a:r>
+            <a:r>
+              <a:rPr lang="en-US" dirty="0" err="1">
+                <a:solidFill>
+                  <a:srgbClr val="595959"/>
+                </a:solidFill>
+                <a:latin typeface="Roboto Condensed" panose="02000000000000000000" pitchFamily="2" charset="0"/>
+              </a:rPr>
+              <a:t>macrovector</a:t>
+            </a:r>
+            <a:r>
+              <a:rPr lang="en-US" dirty="0">
+                <a:solidFill>
+                  <a:srgbClr val="595959"/>
+                </a:solidFill>
+                <a:latin typeface="Roboto Condensed" panose="02000000000000000000" pitchFamily="2" charset="0"/>
+              </a:rPr>
+              <a:t> - </a:t>
+            </a:r>
+            <a:r>
+              <a:rPr lang="en-US" dirty="0" err="1">
+                <a:solidFill>
+                  <a:srgbClr val="595959"/>
+                </a:solidFill>
+                <a:latin typeface="Roboto Condensed" panose="02000000000000000000" pitchFamily="2" charset="0"/>
+              </a:rPr>
+              <a:t>www.freepik.com</a:t>
+            </a:r>
+            <a:endParaRPr lang="en-US" dirty="0"/>
+          </a:p>
+          <a:p>
+            <a:br>
+              <a:rPr lang="en-US" dirty="0"/>
+            </a:br>
+            <a:endParaRPr lang="en-US" dirty="0"/>
+          </a:p>
+        </p:txBody>
+      </p:sp>
+    </p:spTree>
+    <p:extLst>
+      <p:ext uri="{BB962C8B-B14F-4D97-AF65-F5344CB8AC3E}">
+        <p14:creationId xmlns:p14="http://schemas.microsoft.com/office/powerpoint/2010/main" val="23621230"/>
       </p:ext>
     </p:extLst>
   </p:cSld>
@@ -9050,7 +9633,7 @@
           <p:nvPr/>
         </p:nvPicPr>
         <p:blipFill>
-          <a:blip r:embed="rId2"/>
+          <a:blip r:embed="rId3"/>
           <a:stretch>
             <a:fillRect/>
           </a:stretch>
@@ -9183,7 +9766,7 @@
           <p:nvPr/>
         </p:nvPicPr>
         <p:blipFill>
-          <a:blip r:embed="rId2"/>
+          <a:blip r:embed="rId3"/>
           <a:stretch>
             <a:fillRect/>
           </a:stretch>

</xml_diff>